<commit_message>
[Silverfox] 0416 회의 후 결정
1. 조작법 수정
2. 리소스 폴더 생성
</commit_message>
<xml_diff>
--- a/DesignDocs/Design/기획 문서/조작법.pptx
+++ b/DesignDocs/Design/기획 문서/조작법.pptx
@@ -260,7 +260,7 @@
           <a:p>
             <a:fld id="{1CDD92D0-BB6B-47DC-8BB1-EB80184E59B9}" type="datetimeFigureOut">
               <a:rPr lang="ko-KR" altLang="en-US" smtClean="0"/>
-              <a:t>2018-04-11</a:t>
+              <a:t>2018-04-16</a:t>
             </a:fld>
             <a:endParaRPr lang="ko-KR" altLang="en-US"/>
           </a:p>
@@ -458,7 +458,7 @@
           <a:p>
             <a:fld id="{1CDD92D0-BB6B-47DC-8BB1-EB80184E59B9}" type="datetimeFigureOut">
               <a:rPr lang="ko-KR" altLang="en-US" smtClean="0"/>
-              <a:t>2018-04-11</a:t>
+              <a:t>2018-04-16</a:t>
             </a:fld>
             <a:endParaRPr lang="ko-KR" altLang="en-US"/>
           </a:p>
@@ -666,7 +666,7 @@
           <a:p>
             <a:fld id="{1CDD92D0-BB6B-47DC-8BB1-EB80184E59B9}" type="datetimeFigureOut">
               <a:rPr lang="ko-KR" altLang="en-US" smtClean="0"/>
-              <a:t>2018-04-11</a:t>
+              <a:t>2018-04-16</a:t>
             </a:fld>
             <a:endParaRPr lang="ko-KR" altLang="en-US"/>
           </a:p>
@@ -864,7 +864,7 @@
           <a:p>
             <a:fld id="{1CDD92D0-BB6B-47DC-8BB1-EB80184E59B9}" type="datetimeFigureOut">
               <a:rPr lang="ko-KR" altLang="en-US" smtClean="0"/>
-              <a:t>2018-04-11</a:t>
+              <a:t>2018-04-16</a:t>
             </a:fld>
             <a:endParaRPr lang="ko-KR" altLang="en-US"/>
           </a:p>
@@ -1139,7 +1139,7 @@
           <a:p>
             <a:fld id="{1CDD92D0-BB6B-47DC-8BB1-EB80184E59B9}" type="datetimeFigureOut">
               <a:rPr lang="ko-KR" altLang="en-US" smtClean="0"/>
-              <a:t>2018-04-11</a:t>
+              <a:t>2018-04-16</a:t>
             </a:fld>
             <a:endParaRPr lang="ko-KR" altLang="en-US"/>
           </a:p>
@@ -1404,7 +1404,7 @@
           <a:p>
             <a:fld id="{1CDD92D0-BB6B-47DC-8BB1-EB80184E59B9}" type="datetimeFigureOut">
               <a:rPr lang="ko-KR" altLang="en-US" smtClean="0"/>
-              <a:t>2018-04-11</a:t>
+              <a:t>2018-04-16</a:t>
             </a:fld>
             <a:endParaRPr lang="ko-KR" altLang="en-US"/>
           </a:p>
@@ -1816,7 +1816,7 @@
           <a:p>
             <a:fld id="{1CDD92D0-BB6B-47DC-8BB1-EB80184E59B9}" type="datetimeFigureOut">
               <a:rPr lang="ko-KR" altLang="en-US" smtClean="0"/>
-              <a:t>2018-04-11</a:t>
+              <a:t>2018-04-16</a:t>
             </a:fld>
             <a:endParaRPr lang="ko-KR" altLang="en-US"/>
           </a:p>
@@ -1957,7 +1957,7 @@
           <a:p>
             <a:fld id="{1CDD92D0-BB6B-47DC-8BB1-EB80184E59B9}" type="datetimeFigureOut">
               <a:rPr lang="ko-KR" altLang="en-US" smtClean="0"/>
-              <a:t>2018-04-11</a:t>
+              <a:t>2018-04-16</a:t>
             </a:fld>
             <a:endParaRPr lang="ko-KR" altLang="en-US"/>
           </a:p>
@@ -2070,7 +2070,7 @@
           <a:p>
             <a:fld id="{1CDD92D0-BB6B-47DC-8BB1-EB80184E59B9}" type="datetimeFigureOut">
               <a:rPr lang="ko-KR" altLang="en-US" smtClean="0"/>
-              <a:t>2018-04-11</a:t>
+              <a:t>2018-04-16</a:t>
             </a:fld>
             <a:endParaRPr lang="ko-KR" altLang="en-US"/>
           </a:p>
@@ -2381,7 +2381,7 @@
           <a:p>
             <a:fld id="{1CDD92D0-BB6B-47DC-8BB1-EB80184E59B9}" type="datetimeFigureOut">
               <a:rPr lang="ko-KR" altLang="en-US" smtClean="0"/>
-              <a:t>2018-04-11</a:t>
+              <a:t>2018-04-16</a:t>
             </a:fld>
             <a:endParaRPr lang="ko-KR" altLang="en-US"/>
           </a:p>
@@ -2669,7 +2669,7 @@
           <a:p>
             <a:fld id="{1CDD92D0-BB6B-47DC-8BB1-EB80184E59B9}" type="datetimeFigureOut">
               <a:rPr lang="ko-KR" altLang="en-US" smtClean="0"/>
-              <a:t>2018-04-11</a:t>
+              <a:t>2018-04-16</a:t>
             </a:fld>
             <a:endParaRPr lang="ko-KR" altLang="en-US"/>
           </a:p>
@@ -2910,7 +2910,7 @@
           <a:p>
             <a:fld id="{1CDD92D0-BB6B-47DC-8BB1-EB80184E59B9}" type="datetimeFigureOut">
               <a:rPr lang="ko-KR" altLang="en-US" smtClean="0"/>
-              <a:t>2018-04-11</a:t>
+              <a:t>2018-04-16</a:t>
             </a:fld>
             <a:endParaRPr lang="ko-KR" altLang="en-US"/>
           </a:p>
@@ -3844,15 +3844,15 @@
         </p:nvSpPr>
         <p:spPr>
           <a:xfrm>
-            <a:off x="3227059" y="3918088"/>
+            <a:off x="3013788" y="4214785"/>
             <a:ext cx="1847461" cy="811976"/>
           </a:xfrm>
           <a:prstGeom prst="borderCallout1">
             <a:avLst>
               <a:gd name="adj1" fmla="val 49776"/>
               <a:gd name="adj2" fmla="val 758"/>
-              <a:gd name="adj3" fmla="val 9078"/>
-              <a:gd name="adj4" fmla="val -58030"/>
+              <a:gd name="adj3" fmla="val 1258"/>
+              <a:gd name="adj4" fmla="val -59405"/>
             </a:avLst>
           </a:prstGeom>
           <a:ln w="31750"/>
@@ -4168,15 +4168,15 @@
         </p:nvSpPr>
         <p:spPr>
           <a:xfrm>
-            <a:off x="4599993" y="3028897"/>
+            <a:off x="5336593" y="2617024"/>
             <a:ext cx="1847461" cy="811976"/>
           </a:xfrm>
           <a:prstGeom prst="borderCallout1">
             <a:avLst>
               <a:gd name="adj1" fmla="val 49776"/>
               <a:gd name="adj2" fmla="val 758"/>
-              <a:gd name="adj3" fmla="val 9078"/>
-              <a:gd name="adj4" fmla="val -58030"/>
+              <a:gd name="adj3" fmla="val 66949"/>
+              <a:gd name="adj4" fmla="val -97901"/>
             </a:avLst>
           </a:prstGeom>
           <a:ln w="31750"/>
@@ -4205,6 +4205,112 @@
             <a:r>
               <a:rPr lang="ko-KR" altLang="en-US" dirty="0"/>
               <a:t>스킬 합성 메뉴</a:t>
+            </a:r>
+          </a:p>
+        </p:txBody>
+      </p:sp>
+      <p:sp>
+        <p:nvSpPr>
+          <p:cNvPr id="22" name="직사각형 21">
+            <a:extLst>
+              <a:ext uri="{FF2B5EF4-FFF2-40B4-BE49-F238E27FC236}">
+                <a16:creationId xmlns:a16="http://schemas.microsoft.com/office/drawing/2014/main" id="{D3858A7E-5156-4A00-9479-271FF7B3200D}"/>
+              </a:ext>
+            </a:extLst>
+          </p:cNvPr>
+          <p:cNvSpPr/>
+          <p:nvPr/>
+        </p:nvSpPr>
+        <p:spPr>
+          <a:xfrm>
+            <a:off x="2665989" y="3555903"/>
+            <a:ext cx="521231" cy="604264"/>
+          </a:xfrm>
+          <a:prstGeom prst="rect">
+            <a:avLst/>
+          </a:prstGeom>
+          <a:solidFill>
+            <a:schemeClr val="accent1">
+              <a:alpha val="20000"/>
+            </a:schemeClr>
+          </a:solidFill>
+        </p:spPr>
+        <p:style>
+          <a:lnRef idx="2">
+            <a:schemeClr val="accent1">
+              <a:shade val="50000"/>
+            </a:schemeClr>
+          </a:lnRef>
+          <a:fillRef idx="1">
+            <a:schemeClr val="accent1"/>
+          </a:fillRef>
+          <a:effectRef idx="0">
+            <a:schemeClr val="accent1"/>
+          </a:effectRef>
+          <a:fontRef idx="minor">
+            <a:schemeClr val="lt1"/>
+          </a:fontRef>
+        </p:style>
+        <p:txBody>
+          <a:bodyPr rtlCol="0" anchor="ctr"/>
+          <a:lstStyle/>
+          <a:p>
+            <a:pPr algn="ctr"/>
+            <a:endParaRPr lang="ko-KR" altLang="en-US"/>
+          </a:p>
+        </p:txBody>
+      </p:sp>
+      <p:sp>
+        <p:nvSpPr>
+          <p:cNvPr id="23" name="설명선: 선 22">
+            <a:extLst>
+              <a:ext uri="{FF2B5EF4-FFF2-40B4-BE49-F238E27FC236}">
+                <a16:creationId xmlns:a16="http://schemas.microsoft.com/office/drawing/2014/main" id="{F2B7C3D7-072D-483B-B4A3-06A57E619FE4}"/>
+              </a:ext>
+            </a:extLst>
+          </p:cNvPr>
+          <p:cNvSpPr/>
+          <p:nvPr/>
+        </p:nvSpPr>
+        <p:spPr>
+          <a:xfrm>
+            <a:off x="5336593" y="3580515"/>
+            <a:ext cx="1847461" cy="811976"/>
+          </a:xfrm>
+          <a:prstGeom prst="borderCallout1">
+            <a:avLst>
+              <a:gd name="adj1" fmla="val 49776"/>
+              <a:gd name="adj2" fmla="val 758"/>
+              <a:gd name="adj3" fmla="val 41924"/>
+              <a:gd name="adj4" fmla="val -112337"/>
+            </a:avLst>
+          </a:prstGeom>
+          <a:ln w="31750"/>
+        </p:spPr>
+        <p:style>
+          <a:lnRef idx="2">
+            <a:schemeClr val="dk1">
+              <a:shade val="50000"/>
+            </a:schemeClr>
+          </a:lnRef>
+          <a:fillRef idx="1">
+            <a:schemeClr val="dk1"/>
+          </a:fillRef>
+          <a:effectRef idx="0">
+            <a:schemeClr val="dk1"/>
+          </a:effectRef>
+          <a:fontRef idx="minor">
+            <a:schemeClr val="lt1"/>
+          </a:fontRef>
+        </p:style>
+        <p:txBody>
+          <a:bodyPr rtlCol="0" anchor="ctr"/>
+          <a:lstStyle/>
+          <a:p>
+            <a:pPr algn="ctr"/>
+            <a:r>
+              <a:rPr lang="ko-KR" altLang="en-US" dirty="0"/>
+              <a:t>상호작용 키</a:t>
             </a:r>
           </a:p>
         </p:txBody>
@@ -4283,7 +4389,7 @@
         </p:nvSpPr>
         <p:spPr>
           <a:xfrm>
-            <a:off x="391885" y="923731"/>
+            <a:off x="391885" y="1642187"/>
             <a:ext cx="1642188" cy="587828"/>
           </a:xfrm>
           <a:prstGeom prst="rect">
@@ -4681,7 +4787,7 @@
         </p:nvSpPr>
         <p:spPr>
           <a:xfrm>
-            <a:off x="391885" y="1698172"/>
+            <a:off x="10002672" y="1642187"/>
             <a:ext cx="1642188" cy="587828"/>
           </a:xfrm>
           <a:prstGeom prst="rect">
@@ -4730,7 +4836,7 @@
         </p:nvSpPr>
         <p:spPr>
           <a:xfrm>
-            <a:off x="3987280" y="676469"/>
+            <a:off x="6247880" y="695131"/>
             <a:ext cx="1741716" cy="587828"/>
           </a:xfrm>
           <a:prstGeom prst="rect">
@@ -4763,6 +4869,55 @@
               <a:t>메뉴 및 나가기</a:t>
             </a:r>
             <a:endParaRPr lang="ko-KR" altLang="en-US" dirty="0"/>
+          </a:p>
+        </p:txBody>
+      </p:sp>
+      <p:sp>
+        <p:nvSpPr>
+          <p:cNvPr id="15" name="직사각형 14">
+            <a:extLst>
+              <a:ext uri="{FF2B5EF4-FFF2-40B4-BE49-F238E27FC236}">
+                <a16:creationId xmlns:a16="http://schemas.microsoft.com/office/drawing/2014/main" id="{D70166D1-F763-431E-98B8-286CFE2F79D9}"/>
+              </a:ext>
+            </a:extLst>
+          </p:cNvPr>
+          <p:cNvSpPr/>
+          <p:nvPr/>
+        </p:nvSpPr>
+        <p:spPr>
+          <a:xfrm>
+            <a:off x="292357" y="760445"/>
+            <a:ext cx="1741716" cy="587828"/>
+          </a:xfrm>
+          <a:prstGeom prst="rect">
+            <a:avLst/>
+          </a:prstGeom>
+        </p:spPr>
+        <p:style>
+          <a:lnRef idx="2">
+            <a:schemeClr val="dk1">
+              <a:shade val="50000"/>
+            </a:schemeClr>
+          </a:lnRef>
+          <a:fillRef idx="1">
+            <a:schemeClr val="dk1"/>
+          </a:fillRef>
+          <a:effectRef idx="0">
+            <a:schemeClr val="dk1"/>
+          </a:effectRef>
+          <a:fontRef idx="minor">
+            <a:schemeClr val="lt1"/>
+          </a:fontRef>
+        </p:style>
+        <p:txBody>
+          <a:bodyPr rtlCol="0" anchor="ctr"/>
+          <a:lstStyle/>
+          <a:p>
+            <a:pPr algn="ctr"/>
+            <a:r>
+              <a:rPr lang="ko-KR" altLang="en-US" dirty="0"/>
+              <a:t>상호작용 키</a:t>
+            </a:r>
           </a:p>
         </p:txBody>
       </p:sp>

</xml_diff>